<commit_message>
Final production optimization for 80k certificates
</commit_message>
<xml_diff>
--- a/cert-generator/certificate_template.pptx
+++ b/cert-generator/certificate_template.pptx
@@ -246,9 +246,9 @@
                 <a:solidFill>
                   <a:srgbClr val="560A03"/>
                 </a:solidFill>
-                <a:latin typeface="Adobe Arabic" panose="02040503050201020203" pitchFamily="18" charset="-78"/>
-                <a:ea typeface="Kozuka Mincho Pro L" panose="02020300000000000000" pitchFamily="18" charset="-128"/>
-                <a:cs typeface="Adobe Arabic" panose="02040503050201020203" pitchFamily="18" charset="-78"/>
+                <a:latin typeface="Calibri" panose="020F0502020204030204" pitchFamily="34" charset="0"/>
+                <a:ea typeface="Calibri" panose="020F0502020204030204" pitchFamily="34" charset="0"/>
+                <a:cs typeface="Calibri" panose="020F0502020204030204" pitchFamily="34" charset="0"/>
               </a:defRPr>
             </a:lvl1pPr>
           </a:lstStyle>
@@ -294,8 +294,9 @@
                 <a:solidFill>
                   <a:srgbClr val="560A03"/>
                 </a:solidFill>
-                <a:latin typeface="Adobe Arabic" panose="02040503050201020203" pitchFamily="18" charset="-78"/>
-                <a:cs typeface="Adobe Arabic" panose="02040503050201020203" pitchFamily="18" charset="-78"/>
+                <a:latin typeface="Calibri" panose="020F0502020204030204" pitchFamily="34" charset="0"/>
+                <a:ea typeface="Calibri" panose="020F0502020204030204" pitchFamily="34" charset="0"/>
+                <a:cs typeface="Calibri" panose="020F0502020204030204" pitchFamily="34" charset="0"/>
               </a:defRPr>
             </a:lvl1pPr>
           </a:lstStyle>
@@ -341,9 +342,9 @@
                 <a:solidFill>
                   <a:srgbClr val="560A03"/>
                 </a:solidFill>
-                <a:latin typeface="Adobe Arabic" panose="02040503050201020203" pitchFamily="18" charset="-78"/>
+                <a:latin typeface="Calibri" panose="020F0502020204030204" pitchFamily="34" charset="0"/>
                 <a:ea typeface="Calibri" panose="020F0502020204030204" pitchFamily="34" charset="0"/>
-                <a:cs typeface="Adobe Arabic" panose="02040503050201020203" pitchFamily="18" charset="-78"/>
+                <a:cs typeface="Calibri" panose="020F0502020204030204" pitchFamily="34" charset="0"/>
               </a:defRPr>
             </a:lvl1pPr>
           </a:lstStyle>
@@ -389,9 +390,9 @@
                 <a:solidFill>
                   <a:srgbClr val="560A03"/>
                 </a:solidFill>
-                <a:latin typeface="Adobe Arabic" panose="02040503050201020203" pitchFamily="18" charset="-78"/>
-                <a:ea typeface="Kozuka Mincho Pro L" panose="02020300000000000000" pitchFamily="18" charset="-128"/>
-                <a:cs typeface="Adobe Arabic" panose="02040503050201020203" pitchFamily="18" charset="-78"/>
+                <a:latin typeface="Calibri" panose="020F0502020204030204" pitchFamily="34" charset="0"/>
+                <a:ea typeface="Calibri" panose="020F0502020204030204" pitchFamily="34" charset="0"/>
+                <a:cs typeface="Calibri" panose="020F0502020204030204" pitchFamily="34" charset="0"/>
               </a:defRPr>
             </a:lvl1pPr>
           </a:lstStyle>
@@ -431,7 +432,7 @@
           <a:lstStyle>
             <a:lvl1pPr marL="0" indent="0" algn="ctr">
               <a:buNone/>
-              <a:defRPr sz="1800">
+              <a:defRPr sz="1200">
                 <a:solidFill>
                   <a:srgbClr val="560A03"/>
                 </a:solidFill>

</xml_diff>

<commit_message>
Increase script timeout to 4 hours and include certificate template
</commit_message>
<xml_diff>
--- a/cert-generator/certificate_template.pptx
+++ b/cert-generator/certificate_template.pptx
@@ -194,9 +194,9 @@
           <a:lstStyle>
             <a:lvl1pPr marL="0" indent="0" algn="ctr">
               <a:buNone/>
-              <a:defRPr sz="1400" b="1" spc="0" baseline="0">
+              <a:defRPr sz="1200" b="0" spc="0" baseline="0">
                 <a:solidFill>
-                  <a:srgbClr val="560A03"/>
+                  <a:schemeClr val="tx1"/>
                 </a:solidFill>
                 <a:latin typeface="Roboto" panose="02000000000000000000" pitchFamily="2" charset="0"/>
                 <a:ea typeface="Roboto" panose="02000000000000000000" pitchFamily="2" charset="0"/>
@@ -228,7 +228,7 @@
         </p:nvSpPr>
         <p:spPr>
           <a:xfrm>
-            <a:off x="4185919" y="3451175"/>
+            <a:off x="4185919" y="3458795"/>
             <a:ext cx="4257041" cy="249363"/>
           </a:xfrm>
           <a:prstGeom prst="rect">
@@ -242,9 +242,9 @@
           <a:lstStyle>
             <a:lvl1pPr marL="0" indent="0" algn="ctr">
               <a:buNone/>
-              <a:defRPr sz="1400" b="1">
+              <a:defRPr sz="1200" b="0">
                 <a:solidFill>
-                  <a:srgbClr val="560A03"/>
+                  <a:schemeClr val="tx1"/>
                 </a:solidFill>
                 <a:latin typeface="Roboto" panose="02000000000000000000" pitchFamily="2" charset="0"/>
                 <a:ea typeface="Roboto" panose="02000000000000000000" pitchFamily="2" charset="0"/>
@@ -271,12 +271,12 @@
             <a:spLocks noGrp="1"/>
           </p:cNvSpPr>
           <p:nvPr>
-            <p:ph type="body" sz="quarter" idx="14" hasCustomPrompt="1"/>
+            <p:ph type="body" sz="quarter" idx="14"/>
           </p:nvPr>
         </p:nvSpPr>
         <p:spPr>
           <a:xfrm>
-            <a:off x="7335521" y="4102100"/>
+            <a:off x="7335521" y="4129808"/>
             <a:ext cx="1107440" cy="228600"/>
           </a:xfrm>
           <a:prstGeom prst="rect">
@@ -290,9 +290,9 @@
           <a:lstStyle>
             <a:lvl1pPr marL="0" indent="0" algn="ctr">
               <a:buNone/>
-              <a:defRPr sz="1400" b="1">
+              <a:defRPr sz="1200" b="0">
                 <a:solidFill>
-                  <a:srgbClr val="560A03"/>
+                  <a:schemeClr val="tx1"/>
                 </a:solidFill>
                 <a:latin typeface="Roboto" panose="02000000000000000000" pitchFamily="2" charset="0"/>
                 <a:ea typeface="Roboto" panose="02000000000000000000" pitchFamily="2" charset="0"/>
@@ -302,10 +302,7 @@
           </a:lstStyle>
           <a:p>
             <a:pPr lvl="0"/>
-            <a:r>
-              <a:rPr lang="en-US" dirty="0"/>
-              <a:t>2025-26</a:t>
-            </a:r>
+            <a:endParaRPr lang="en-US" dirty="0"/>
           </a:p>
         </p:txBody>
       </p:sp>
@@ -341,9 +338,9 @@
           <a:lstStyle>
             <a:lvl1pPr marL="0" indent="0" algn="ctr">
               <a:buNone/>
-              <a:defRPr sz="1400" b="1">
+              <a:defRPr sz="1200" b="0">
                 <a:solidFill>
-                  <a:srgbClr val="560A03"/>
+                  <a:schemeClr val="tx1"/>
                 </a:solidFill>
                 <a:latin typeface="Roboto" panose="02000000000000000000" pitchFamily="2" charset="0"/>
                 <a:ea typeface="Roboto" panose="02000000000000000000" pitchFamily="2" charset="0"/>
@@ -375,7 +372,7 @@
         </p:nvSpPr>
         <p:spPr>
           <a:xfrm>
-            <a:off x="5524500" y="3774848"/>
+            <a:off x="5524500" y="3797708"/>
             <a:ext cx="2817494" cy="169862"/>
           </a:xfrm>
           <a:prstGeom prst="rect">
@@ -389,9 +386,9 @@
           <a:lstStyle>
             <a:lvl1pPr marL="0" indent="0" algn="ctr">
               <a:buNone/>
-              <a:defRPr sz="1400" b="1">
+              <a:defRPr sz="1400" b="0">
                 <a:solidFill>
-                  <a:srgbClr val="560A03"/>
+                  <a:schemeClr val="tx1"/>
                 </a:solidFill>
                 <a:latin typeface="Roboto" panose="02000000000000000000" pitchFamily="2" charset="0"/>
                 <a:ea typeface="Roboto" panose="02000000000000000000" pitchFamily="2" charset="0"/>
@@ -514,7 +511,7 @@
         <p:spPr>
           <a:xfrm>
             <a:off x="4882356" y="4483847"/>
-            <a:ext cx="1284288" cy="169862"/>
+            <a:ext cx="1962944" cy="169862"/>
           </a:xfrm>
           <a:prstGeom prst="rect">
             <a:avLst/>
@@ -525,9 +522,9 @@
           <a:lstStyle>
             <a:lvl1pPr marL="0" indent="0">
               <a:buNone/>
-              <a:defRPr sz="1400" b="1">
+              <a:defRPr sz="1200" b="0">
                 <a:solidFill>
-                  <a:srgbClr val="560A03"/>
+                  <a:schemeClr val="tx1"/>
                 </a:solidFill>
                 <a:latin typeface="Roboto" panose="02000000000000000000" pitchFamily="2" charset="0"/>
                 <a:ea typeface="Roboto" panose="02000000000000000000" pitchFamily="2" charset="0"/>

</xml_diff>